<commit_message>
Create what's a map slide
</commit_message>
<xml_diff>
--- a/maps/Map.pptx
+++ b/maps/Map.pptx
@@ -6,6 +6,7 @@
   </p:sldMasterIdLst>
   <p:sldIdLst>
     <p:sldId id="256" r:id="rId2"/>
+    <p:sldId id="257" r:id="rId3"/>
   </p:sldIdLst>
   <p:sldSz cx="12192000" cy="6858000"/>
   <p:notesSz cx="6858000" cy="9144000"/>
@@ -3456,6 +3457,623 @@
 </p:sld>
 </file>
 
+<file path=ppt/slides/slide2.xml><?xml version="1.0" encoding="utf-8"?>
+<p:sld xmlns:a="http://schemas.openxmlformats.org/drawingml/2006/main" xmlns:r="http://schemas.openxmlformats.org/officeDocument/2006/relationships" xmlns:p="http://schemas.openxmlformats.org/presentationml/2006/main">
+  <p:cSld>
+    <p:spTree>
+      <p:nvGrpSpPr>
+        <p:cNvPr id="1" name=""/>
+        <p:cNvGrpSpPr/>
+        <p:nvPr/>
+      </p:nvGrpSpPr>
+      <p:grpSpPr>
+        <a:xfrm>
+          <a:off x="0" y="0"/>
+          <a:ext cx="0" cy="0"/>
+          <a:chOff x="0" y="0"/>
+          <a:chExt cx="0" cy="0"/>
+        </a:xfrm>
+      </p:grpSpPr>
+      <p:sp>
+        <p:nvSpPr>
+          <p:cNvPr id="12" name="Rectangle 11">
+            <a:extLst>
+              <a:ext uri="{FF2B5EF4-FFF2-40B4-BE49-F238E27FC236}">
+                <a16:creationId xmlns:a16="http://schemas.microsoft.com/office/drawing/2014/main" id="{F1D18412-AE10-4B0B-8D23-47FFE38A28F2}"/>
+              </a:ext>
+            </a:extLst>
+          </p:cNvPr>
+          <p:cNvSpPr/>
+          <p:nvPr/>
+        </p:nvSpPr>
+        <p:spPr>
+          <a:xfrm>
+            <a:off x="6096000" y="4625439"/>
+            <a:ext cx="3048000" cy="1698171"/>
+          </a:xfrm>
+          <a:prstGeom prst="rect">
+            <a:avLst/>
+          </a:prstGeom>
+        </p:spPr>
+        <p:style>
+          <a:lnRef idx="2">
+            <a:schemeClr val="accent5">
+              <a:shade val="50000"/>
+            </a:schemeClr>
+          </a:lnRef>
+          <a:fillRef idx="1">
+            <a:schemeClr val="accent5"/>
+          </a:fillRef>
+          <a:effectRef idx="0">
+            <a:schemeClr val="accent5"/>
+          </a:effectRef>
+          <a:fontRef idx="minor">
+            <a:schemeClr val="lt1"/>
+          </a:fontRef>
+        </p:style>
+        <p:txBody>
+          <a:bodyPr rtlCol="0" anchor="ctr"/>
+          <a:lstStyle/>
+          <a:p>
+            <a:pPr algn="ctr"/>
+            <a:endParaRPr lang="en-US"/>
+          </a:p>
+        </p:txBody>
+      </p:sp>
+      <p:sp>
+        <p:nvSpPr>
+          <p:cNvPr id="2" name="Title 1">
+            <a:extLst>
+              <a:ext uri="{FF2B5EF4-FFF2-40B4-BE49-F238E27FC236}">
+                <a16:creationId xmlns:a16="http://schemas.microsoft.com/office/drawing/2014/main" id="{CFD8E02E-0BAD-42EA-BB8B-A0DBC2F01EA9}"/>
+              </a:ext>
+            </a:extLst>
+          </p:cNvPr>
+          <p:cNvSpPr>
+            <a:spLocks noGrp="1"/>
+          </p:cNvSpPr>
+          <p:nvPr>
+            <p:ph type="title"/>
+          </p:nvPr>
+        </p:nvSpPr>
+        <p:spPr/>
+        <p:txBody>
+          <a:bodyPr/>
+          <a:lstStyle/>
+          <a:p>
+            <a:r>
+              <a:rPr lang="en-US" dirty="0"/>
+              <a:t>What’s a map?</a:t>
+            </a:r>
+          </a:p>
+        </p:txBody>
+      </p:sp>
+      <p:sp>
+        <p:nvSpPr>
+          <p:cNvPr id="3" name="Content Placeholder 2">
+            <a:extLst>
+              <a:ext uri="{FF2B5EF4-FFF2-40B4-BE49-F238E27FC236}">
+                <a16:creationId xmlns:a16="http://schemas.microsoft.com/office/drawing/2014/main" id="{F80601A2-0D24-4EE9-872A-5DF705BE9579}"/>
+              </a:ext>
+            </a:extLst>
+          </p:cNvPr>
+          <p:cNvSpPr>
+            <a:spLocks noGrp="1"/>
+          </p:cNvSpPr>
+          <p:nvPr>
+            <p:ph idx="1"/>
+          </p:nvPr>
+        </p:nvSpPr>
+        <p:spPr/>
+        <p:txBody>
+          <a:bodyPr/>
+          <a:lstStyle/>
+          <a:p>
+            <a:r>
+              <a:rPr lang="en-US" dirty="0"/>
+              <a:t>Data structure collection of key value pairs</a:t>
+            </a:r>
+          </a:p>
+          <a:p>
+            <a:r>
+              <a:rPr lang="en-US" dirty="0"/>
+              <a:t>Similar to a dictionary </a:t>
+            </a:r>
+            <a:r>
+              <a:rPr lang="en-US"/>
+              <a:t>in Python </a:t>
+            </a:r>
+            <a:r>
+              <a:rPr lang="en-US" dirty="0"/>
+              <a:t>or a </a:t>
+            </a:r>
+            <a:r>
+              <a:rPr lang="en-US" dirty="0" err="1"/>
+              <a:t>hashmap</a:t>
+            </a:r>
+            <a:r>
+              <a:rPr lang="en-US" dirty="0"/>
+              <a:t> Java.</a:t>
+            </a:r>
+          </a:p>
+        </p:txBody>
+      </p:sp>
+      <p:sp>
+        <p:nvSpPr>
+          <p:cNvPr id="5" name="Rectangle 4">
+            <a:extLst>
+              <a:ext uri="{FF2B5EF4-FFF2-40B4-BE49-F238E27FC236}">
+                <a16:creationId xmlns:a16="http://schemas.microsoft.com/office/drawing/2014/main" id="{0856760A-0A67-42B7-B74E-76BC096F2ED3}"/>
+              </a:ext>
+            </a:extLst>
+          </p:cNvPr>
+          <p:cNvSpPr/>
+          <p:nvPr/>
+        </p:nvSpPr>
+        <p:spPr>
+          <a:xfrm>
+            <a:off x="7006442" y="3990109"/>
+            <a:ext cx="926275" cy="356260"/>
+          </a:xfrm>
+          <a:prstGeom prst="rect">
+            <a:avLst/>
+          </a:prstGeom>
+        </p:spPr>
+        <p:style>
+          <a:lnRef idx="2">
+            <a:schemeClr val="accent1">
+              <a:shade val="50000"/>
+            </a:schemeClr>
+          </a:lnRef>
+          <a:fillRef idx="1">
+            <a:schemeClr val="accent1"/>
+          </a:fillRef>
+          <a:effectRef idx="0">
+            <a:schemeClr val="accent1"/>
+          </a:effectRef>
+          <a:fontRef idx="minor">
+            <a:schemeClr val="lt1"/>
+          </a:fontRef>
+        </p:style>
+        <p:txBody>
+          <a:bodyPr rtlCol="0" anchor="ctr"/>
+          <a:lstStyle/>
+          <a:p>
+            <a:pPr algn="ctr"/>
+            <a:r>
+              <a:rPr lang="en-US" dirty="0"/>
+              <a:t>Map</a:t>
+            </a:r>
+          </a:p>
+        </p:txBody>
+      </p:sp>
+      <p:sp>
+        <p:nvSpPr>
+          <p:cNvPr id="6" name="Rectangle 5">
+            <a:extLst>
+              <a:ext uri="{FF2B5EF4-FFF2-40B4-BE49-F238E27FC236}">
+                <a16:creationId xmlns:a16="http://schemas.microsoft.com/office/drawing/2014/main" id="{948076C7-7602-4150-8C86-AA76AD720DCE}"/>
+              </a:ext>
+            </a:extLst>
+          </p:cNvPr>
+          <p:cNvSpPr/>
+          <p:nvPr/>
+        </p:nvSpPr>
+        <p:spPr>
+          <a:xfrm>
+            <a:off x="6331637" y="4803569"/>
+            <a:ext cx="926275" cy="356260"/>
+          </a:xfrm>
+          <a:prstGeom prst="rect">
+            <a:avLst/>
+          </a:prstGeom>
+        </p:spPr>
+        <p:style>
+          <a:lnRef idx="2">
+            <a:schemeClr val="accent1">
+              <a:shade val="50000"/>
+            </a:schemeClr>
+          </a:lnRef>
+          <a:fillRef idx="1">
+            <a:schemeClr val="accent1"/>
+          </a:fillRef>
+          <a:effectRef idx="0">
+            <a:schemeClr val="accent1"/>
+          </a:effectRef>
+          <a:fontRef idx="minor">
+            <a:schemeClr val="lt1"/>
+          </a:fontRef>
+        </p:style>
+        <p:txBody>
+          <a:bodyPr rtlCol="0" anchor="ctr"/>
+          <a:lstStyle/>
+          <a:p>
+            <a:pPr algn="ctr"/>
+            <a:r>
+              <a:rPr lang="en-US" dirty="0"/>
+              <a:t>key</a:t>
+            </a:r>
+          </a:p>
+        </p:txBody>
+      </p:sp>
+      <p:sp>
+        <p:nvSpPr>
+          <p:cNvPr id="7" name="Rectangle 6">
+            <a:extLst>
+              <a:ext uri="{FF2B5EF4-FFF2-40B4-BE49-F238E27FC236}">
+                <a16:creationId xmlns:a16="http://schemas.microsoft.com/office/drawing/2014/main" id="{99FA2EEA-9AA9-427B-BF89-E504BF597266}"/>
+              </a:ext>
+            </a:extLst>
+          </p:cNvPr>
+          <p:cNvSpPr/>
+          <p:nvPr/>
+        </p:nvSpPr>
+        <p:spPr>
+          <a:xfrm>
+            <a:off x="6331637" y="5717969"/>
+            <a:ext cx="926275" cy="356260"/>
+          </a:xfrm>
+          <a:prstGeom prst="rect">
+            <a:avLst/>
+          </a:prstGeom>
+        </p:spPr>
+        <p:style>
+          <a:lnRef idx="2">
+            <a:schemeClr val="accent1">
+              <a:shade val="50000"/>
+            </a:schemeClr>
+          </a:lnRef>
+          <a:fillRef idx="1">
+            <a:schemeClr val="accent1"/>
+          </a:fillRef>
+          <a:effectRef idx="0">
+            <a:schemeClr val="accent1"/>
+          </a:effectRef>
+          <a:fontRef idx="minor">
+            <a:schemeClr val="lt1"/>
+          </a:fontRef>
+        </p:style>
+        <p:txBody>
+          <a:bodyPr rtlCol="0" anchor="ctr"/>
+          <a:lstStyle/>
+          <a:p>
+            <a:pPr algn="ctr"/>
+            <a:r>
+              <a:rPr lang="en-US" dirty="0"/>
+              <a:t>key</a:t>
+            </a:r>
+          </a:p>
+        </p:txBody>
+      </p:sp>
+      <p:sp>
+        <p:nvSpPr>
+          <p:cNvPr id="8" name="Rectangle 7">
+            <a:extLst>
+              <a:ext uri="{FF2B5EF4-FFF2-40B4-BE49-F238E27FC236}">
+                <a16:creationId xmlns:a16="http://schemas.microsoft.com/office/drawing/2014/main" id="{2AA0793E-9191-4056-BECA-64009A8A2489}"/>
+              </a:ext>
+            </a:extLst>
+          </p:cNvPr>
+          <p:cNvSpPr/>
+          <p:nvPr/>
+        </p:nvSpPr>
+        <p:spPr>
+          <a:xfrm>
+            <a:off x="6331637" y="5260769"/>
+            <a:ext cx="926275" cy="356260"/>
+          </a:xfrm>
+          <a:prstGeom prst="rect">
+            <a:avLst/>
+          </a:prstGeom>
+        </p:spPr>
+        <p:style>
+          <a:lnRef idx="2">
+            <a:schemeClr val="accent1">
+              <a:shade val="50000"/>
+            </a:schemeClr>
+          </a:lnRef>
+          <a:fillRef idx="1">
+            <a:schemeClr val="accent1"/>
+          </a:fillRef>
+          <a:effectRef idx="0">
+            <a:schemeClr val="accent1"/>
+          </a:effectRef>
+          <a:fontRef idx="minor">
+            <a:schemeClr val="lt1"/>
+          </a:fontRef>
+        </p:style>
+        <p:txBody>
+          <a:bodyPr rtlCol="0" anchor="ctr"/>
+          <a:lstStyle/>
+          <a:p>
+            <a:pPr algn="ctr"/>
+            <a:r>
+              <a:rPr lang="en-US" dirty="0"/>
+              <a:t>key</a:t>
+            </a:r>
+          </a:p>
+        </p:txBody>
+      </p:sp>
+      <p:sp>
+        <p:nvSpPr>
+          <p:cNvPr id="9" name="Rectangle 8">
+            <a:extLst>
+              <a:ext uri="{FF2B5EF4-FFF2-40B4-BE49-F238E27FC236}">
+                <a16:creationId xmlns:a16="http://schemas.microsoft.com/office/drawing/2014/main" id="{55454865-3EB8-4C11-9505-16310EF8C98F}"/>
+              </a:ext>
+            </a:extLst>
+          </p:cNvPr>
+          <p:cNvSpPr/>
+          <p:nvPr/>
+        </p:nvSpPr>
+        <p:spPr>
+          <a:xfrm>
+            <a:off x="7926779" y="5725020"/>
+            <a:ext cx="926275" cy="356260"/>
+          </a:xfrm>
+          <a:prstGeom prst="rect">
+            <a:avLst/>
+          </a:prstGeom>
+        </p:spPr>
+        <p:style>
+          <a:lnRef idx="2">
+            <a:schemeClr val="accent1">
+              <a:shade val="50000"/>
+            </a:schemeClr>
+          </a:lnRef>
+          <a:fillRef idx="1">
+            <a:schemeClr val="accent1"/>
+          </a:fillRef>
+          <a:effectRef idx="0">
+            <a:schemeClr val="accent1"/>
+          </a:effectRef>
+          <a:fontRef idx="minor">
+            <a:schemeClr val="lt1"/>
+          </a:fontRef>
+        </p:style>
+        <p:txBody>
+          <a:bodyPr rtlCol="0" anchor="ctr"/>
+          <a:lstStyle/>
+          <a:p>
+            <a:pPr algn="ctr"/>
+            <a:r>
+              <a:rPr lang="en-US" dirty="0"/>
+              <a:t>value</a:t>
+            </a:r>
+          </a:p>
+        </p:txBody>
+      </p:sp>
+      <p:sp>
+        <p:nvSpPr>
+          <p:cNvPr id="10" name="Rectangle 9">
+            <a:extLst>
+              <a:ext uri="{FF2B5EF4-FFF2-40B4-BE49-F238E27FC236}">
+                <a16:creationId xmlns:a16="http://schemas.microsoft.com/office/drawing/2014/main" id="{A83E09FF-7898-40AF-871E-B15E33155FB2}"/>
+              </a:ext>
+            </a:extLst>
+          </p:cNvPr>
+          <p:cNvSpPr/>
+          <p:nvPr/>
+        </p:nvSpPr>
+        <p:spPr>
+          <a:xfrm>
+            <a:off x="7926779" y="5260769"/>
+            <a:ext cx="926275" cy="356260"/>
+          </a:xfrm>
+          <a:prstGeom prst="rect">
+            <a:avLst/>
+          </a:prstGeom>
+        </p:spPr>
+        <p:style>
+          <a:lnRef idx="2">
+            <a:schemeClr val="accent1">
+              <a:shade val="50000"/>
+            </a:schemeClr>
+          </a:lnRef>
+          <a:fillRef idx="1">
+            <a:schemeClr val="accent1"/>
+          </a:fillRef>
+          <a:effectRef idx="0">
+            <a:schemeClr val="accent1"/>
+          </a:effectRef>
+          <a:fontRef idx="minor">
+            <a:schemeClr val="lt1"/>
+          </a:fontRef>
+        </p:style>
+        <p:txBody>
+          <a:bodyPr rtlCol="0" anchor="ctr"/>
+          <a:lstStyle/>
+          <a:p>
+            <a:pPr algn="ctr"/>
+            <a:r>
+              <a:rPr lang="en-US" dirty="0"/>
+              <a:t>value</a:t>
+            </a:r>
+          </a:p>
+        </p:txBody>
+      </p:sp>
+      <p:sp>
+        <p:nvSpPr>
+          <p:cNvPr id="11" name="Rectangle 10">
+            <a:extLst>
+              <a:ext uri="{FF2B5EF4-FFF2-40B4-BE49-F238E27FC236}">
+                <a16:creationId xmlns:a16="http://schemas.microsoft.com/office/drawing/2014/main" id="{FC7820FA-3ACD-4028-8837-FA739D3425C6}"/>
+              </a:ext>
+            </a:extLst>
+          </p:cNvPr>
+          <p:cNvSpPr/>
+          <p:nvPr/>
+        </p:nvSpPr>
+        <p:spPr>
+          <a:xfrm>
+            <a:off x="7926779" y="4803569"/>
+            <a:ext cx="926275" cy="356260"/>
+          </a:xfrm>
+          <a:prstGeom prst="rect">
+            <a:avLst/>
+          </a:prstGeom>
+        </p:spPr>
+        <p:style>
+          <a:lnRef idx="2">
+            <a:schemeClr val="accent1">
+              <a:shade val="50000"/>
+            </a:schemeClr>
+          </a:lnRef>
+          <a:fillRef idx="1">
+            <a:schemeClr val="accent1"/>
+          </a:fillRef>
+          <a:effectRef idx="0">
+            <a:schemeClr val="accent1"/>
+          </a:effectRef>
+          <a:fontRef idx="minor">
+            <a:schemeClr val="lt1"/>
+          </a:fontRef>
+        </p:style>
+        <p:txBody>
+          <a:bodyPr rtlCol="0" anchor="ctr"/>
+          <a:lstStyle/>
+          <a:p>
+            <a:pPr algn="ctr"/>
+            <a:r>
+              <a:rPr lang="en-US" dirty="0"/>
+              <a:t>value</a:t>
+            </a:r>
+          </a:p>
+        </p:txBody>
+      </p:sp>
+      <p:cxnSp>
+        <p:nvCxnSpPr>
+          <p:cNvPr id="14" name="Straight Arrow Connector 13">
+            <a:extLst>
+              <a:ext uri="{FF2B5EF4-FFF2-40B4-BE49-F238E27FC236}">
+                <a16:creationId xmlns:a16="http://schemas.microsoft.com/office/drawing/2014/main" id="{ED2C6E5D-8F3D-43AA-8159-F19362F02B72}"/>
+              </a:ext>
+            </a:extLst>
+          </p:cNvPr>
+          <p:cNvCxnSpPr>
+            <a:stCxn id="6" idx="3"/>
+            <a:endCxn id="11" idx="1"/>
+          </p:cNvCxnSpPr>
+          <p:nvPr/>
+        </p:nvCxnSpPr>
+        <p:spPr>
+          <a:xfrm>
+            <a:off x="7257912" y="4981699"/>
+            <a:ext cx="668867" cy="0"/>
+          </a:xfrm>
+          <a:prstGeom prst="straightConnector1">
+            <a:avLst/>
+          </a:prstGeom>
+          <a:ln>
+            <a:tailEnd type="triangle"/>
+          </a:ln>
+        </p:spPr>
+        <p:style>
+          <a:lnRef idx="1">
+            <a:schemeClr val="dk1"/>
+          </a:lnRef>
+          <a:fillRef idx="0">
+            <a:schemeClr val="dk1"/>
+          </a:fillRef>
+          <a:effectRef idx="0">
+            <a:schemeClr val="dk1"/>
+          </a:effectRef>
+          <a:fontRef idx="minor">
+            <a:schemeClr val="tx1"/>
+          </a:fontRef>
+        </p:style>
+      </p:cxnSp>
+      <p:cxnSp>
+        <p:nvCxnSpPr>
+          <p:cNvPr id="16" name="Straight Arrow Connector 15">
+            <a:extLst>
+              <a:ext uri="{FF2B5EF4-FFF2-40B4-BE49-F238E27FC236}">
+                <a16:creationId xmlns:a16="http://schemas.microsoft.com/office/drawing/2014/main" id="{49BD34A2-BA90-48B5-B132-66F548D1F7AC}"/>
+              </a:ext>
+            </a:extLst>
+          </p:cNvPr>
+          <p:cNvCxnSpPr/>
+          <p:nvPr/>
+        </p:nvCxnSpPr>
+        <p:spPr>
+          <a:xfrm>
+            <a:off x="7257912" y="5894119"/>
+            <a:ext cx="668867" cy="0"/>
+          </a:xfrm>
+          <a:prstGeom prst="straightConnector1">
+            <a:avLst/>
+          </a:prstGeom>
+          <a:ln>
+            <a:tailEnd type="triangle"/>
+          </a:ln>
+        </p:spPr>
+        <p:style>
+          <a:lnRef idx="1">
+            <a:schemeClr val="dk1"/>
+          </a:lnRef>
+          <a:fillRef idx="0">
+            <a:schemeClr val="dk1"/>
+          </a:fillRef>
+          <a:effectRef idx="0">
+            <a:schemeClr val="dk1"/>
+          </a:effectRef>
+          <a:fontRef idx="minor">
+            <a:schemeClr val="tx1"/>
+          </a:fontRef>
+        </p:style>
+      </p:cxnSp>
+      <p:cxnSp>
+        <p:nvCxnSpPr>
+          <p:cNvPr id="17" name="Straight Arrow Connector 16">
+            <a:extLst>
+              <a:ext uri="{FF2B5EF4-FFF2-40B4-BE49-F238E27FC236}">
+                <a16:creationId xmlns:a16="http://schemas.microsoft.com/office/drawing/2014/main" id="{83C0799C-4F2C-4186-9DB2-0C6D6424D712}"/>
+              </a:ext>
+            </a:extLst>
+          </p:cNvPr>
+          <p:cNvCxnSpPr/>
+          <p:nvPr/>
+        </p:nvCxnSpPr>
+        <p:spPr>
+          <a:xfrm>
+            <a:off x="7257912" y="5452754"/>
+            <a:ext cx="668867" cy="0"/>
+          </a:xfrm>
+          <a:prstGeom prst="straightConnector1">
+            <a:avLst/>
+          </a:prstGeom>
+          <a:ln>
+            <a:tailEnd type="triangle"/>
+          </a:ln>
+        </p:spPr>
+        <p:style>
+          <a:lnRef idx="1">
+            <a:schemeClr val="dk1"/>
+          </a:lnRef>
+          <a:fillRef idx="0">
+            <a:schemeClr val="dk1"/>
+          </a:fillRef>
+          <a:effectRef idx="0">
+            <a:schemeClr val="dk1"/>
+          </a:effectRef>
+          <a:fontRef idx="minor">
+            <a:schemeClr val="tx1"/>
+          </a:fontRef>
+        </p:style>
+      </p:cxnSp>
+    </p:spTree>
+    <p:extLst>
+      <p:ext uri="{BB962C8B-B14F-4D97-AF65-F5344CB8AC3E}">
+        <p14:creationId xmlns:p14="http://schemas.microsoft.com/office/powerpoint/2010/main" val="1258595971"/>
+      </p:ext>
+    </p:extLst>
+  </p:cSld>
+  <p:clrMapOvr>
+    <a:masterClrMapping/>
+  </p:clrMapOvr>
+</p:sld>
+</file>
+
 <file path=ppt/theme/theme1.xml><?xml version="1.0" encoding="utf-8"?>
 <a:theme xmlns:a="http://schemas.openxmlformats.org/drawingml/2006/main" name="Frame">
   <a:themeElements>

</xml_diff>

<commit_message>
Complete declaring map slide and create adding to a map slide
</commit_message>
<xml_diff>
--- a/maps/Map.pptx
+++ b/maps/Map.pptx
@@ -7,6 +7,7 @@
   <p:sldIdLst>
     <p:sldId id="256" r:id="rId2"/>
     <p:sldId id="257" r:id="rId3"/>
+    <p:sldId id="258" r:id="rId4"/>
   </p:sldIdLst>
   <p:sldSz cx="12192000" cy="6858000"/>
   <p:notesSz cx="6858000" cy="9144000"/>
@@ -3577,15 +3578,7 @@
           <a:p>
             <a:r>
               <a:rPr lang="en-US" dirty="0"/>
-              <a:t>Similar to a dictionary </a:t>
-            </a:r>
-            <a:r>
-              <a:rPr lang="en-US"/>
-              <a:t>in Python </a:t>
-            </a:r>
-            <a:r>
-              <a:rPr lang="en-US" dirty="0"/>
-              <a:t>or a </a:t>
+              <a:t>Similar to a dictionary in Python or a </a:t>
             </a:r>
             <a:r>
               <a:rPr lang="en-US" dirty="0" err="1"/>
@@ -4061,10 +4054,283 @@
           </a:fontRef>
         </p:style>
       </p:cxnSp>
+      <p:sp>
+        <p:nvSpPr>
+          <p:cNvPr id="19" name="Left Brace 18">
+            <a:extLst>
+              <a:ext uri="{FF2B5EF4-FFF2-40B4-BE49-F238E27FC236}">
+                <a16:creationId xmlns:a16="http://schemas.microsoft.com/office/drawing/2014/main" id="{C11611B7-F596-4938-A83A-36D33485CED7}"/>
+              </a:ext>
+            </a:extLst>
+          </p:cNvPr>
+          <p:cNvSpPr/>
+          <p:nvPr/>
+        </p:nvSpPr>
+        <p:spPr>
+          <a:xfrm>
+            <a:off x="5405362" y="4625439"/>
+            <a:ext cx="354170" cy="1698171"/>
+          </a:xfrm>
+          <a:prstGeom prst="leftBrace">
+            <a:avLst/>
+          </a:prstGeom>
+        </p:spPr>
+        <p:style>
+          <a:lnRef idx="1">
+            <a:schemeClr val="accent1"/>
+          </a:lnRef>
+          <a:fillRef idx="0">
+            <a:schemeClr val="accent1"/>
+          </a:fillRef>
+          <a:effectRef idx="0">
+            <a:schemeClr val="accent1"/>
+          </a:effectRef>
+          <a:fontRef idx="minor">
+            <a:schemeClr val="tx1"/>
+          </a:fontRef>
+        </p:style>
+        <p:txBody>
+          <a:bodyPr rtlCol="0" anchor="ctr"/>
+          <a:lstStyle/>
+          <a:p>
+            <a:pPr algn="ctr"/>
+            <a:endParaRPr lang="en-US"/>
+          </a:p>
+        </p:txBody>
+      </p:sp>
+      <p:sp>
+        <p:nvSpPr>
+          <p:cNvPr id="20" name="Right Brace 19">
+            <a:extLst>
+              <a:ext uri="{FF2B5EF4-FFF2-40B4-BE49-F238E27FC236}">
+                <a16:creationId xmlns:a16="http://schemas.microsoft.com/office/drawing/2014/main" id="{5FD5AC38-A051-48E5-91CD-6F5C6244532D}"/>
+              </a:ext>
+            </a:extLst>
+          </p:cNvPr>
+          <p:cNvSpPr/>
+          <p:nvPr/>
+        </p:nvSpPr>
+        <p:spPr>
+          <a:xfrm>
+            <a:off x="9480468" y="4625439"/>
+            <a:ext cx="277090" cy="1698171"/>
+          </a:xfrm>
+          <a:prstGeom prst="rightBrace">
+            <a:avLst/>
+          </a:prstGeom>
+        </p:spPr>
+        <p:style>
+          <a:lnRef idx="1">
+            <a:schemeClr val="accent1"/>
+          </a:lnRef>
+          <a:fillRef idx="0">
+            <a:schemeClr val="accent1"/>
+          </a:fillRef>
+          <a:effectRef idx="0">
+            <a:schemeClr val="accent1"/>
+          </a:effectRef>
+          <a:fontRef idx="minor">
+            <a:schemeClr val="tx1"/>
+          </a:fontRef>
+        </p:style>
+        <p:txBody>
+          <a:bodyPr rtlCol="0" anchor="ctr"/>
+          <a:lstStyle/>
+          <a:p>
+            <a:pPr algn="ctr"/>
+            <a:endParaRPr lang="en-US"/>
+          </a:p>
+        </p:txBody>
+      </p:sp>
+      <p:sp>
+        <p:nvSpPr>
+          <p:cNvPr id="21" name="Rectangle 20">
+            <a:extLst>
+              <a:ext uri="{FF2B5EF4-FFF2-40B4-BE49-F238E27FC236}">
+                <a16:creationId xmlns:a16="http://schemas.microsoft.com/office/drawing/2014/main" id="{77ABF6D5-C771-4FD5-8715-7B9E5E0BDAFD}"/>
+              </a:ext>
+            </a:extLst>
+          </p:cNvPr>
+          <p:cNvSpPr/>
+          <p:nvPr/>
+        </p:nvSpPr>
+        <p:spPr>
+          <a:xfrm>
+            <a:off x="4445549" y="5031180"/>
+            <a:ext cx="959813" cy="843148"/>
+          </a:xfrm>
+          <a:prstGeom prst="rect">
+            <a:avLst/>
+          </a:prstGeom>
+        </p:spPr>
+        <p:style>
+          <a:lnRef idx="2">
+            <a:schemeClr val="accent1">
+              <a:shade val="50000"/>
+            </a:schemeClr>
+          </a:lnRef>
+          <a:fillRef idx="1">
+            <a:schemeClr val="accent1"/>
+          </a:fillRef>
+          <a:effectRef idx="0">
+            <a:schemeClr val="accent1"/>
+          </a:effectRef>
+          <a:fontRef idx="minor">
+            <a:schemeClr val="lt1"/>
+          </a:fontRef>
+        </p:style>
+        <p:txBody>
+          <a:bodyPr rtlCol="0" anchor="ctr"/>
+          <a:lstStyle/>
+          <a:p>
+            <a:pPr algn="ctr"/>
+            <a:r>
+              <a:rPr lang="en-US" dirty="0"/>
+              <a:t>All the same type</a:t>
+            </a:r>
+          </a:p>
+        </p:txBody>
+      </p:sp>
+      <p:sp>
+        <p:nvSpPr>
+          <p:cNvPr id="22" name="Rectangle 21">
+            <a:extLst>
+              <a:ext uri="{FF2B5EF4-FFF2-40B4-BE49-F238E27FC236}">
+                <a16:creationId xmlns:a16="http://schemas.microsoft.com/office/drawing/2014/main" id="{9C368B2D-4D86-428A-BF76-A273F9F8CA86}"/>
+              </a:ext>
+            </a:extLst>
+          </p:cNvPr>
+          <p:cNvSpPr/>
+          <p:nvPr/>
+        </p:nvSpPr>
+        <p:spPr>
+          <a:xfrm>
+            <a:off x="9791424" y="5103298"/>
+            <a:ext cx="892409" cy="771030"/>
+          </a:xfrm>
+          <a:prstGeom prst="rect">
+            <a:avLst/>
+          </a:prstGeom>
+        </p:spPr>
+        <p:style>
+          <a:lnRef idx="2">
+            <a:schemeClr val="accent1">
+              <a:shade val="50000"/>
+            </a:schemeClr>
+          </a:lnRef>
+          <a:fillRef idx="1">
+            <a:schemeClr val="accent1"/>
+          </a:fillRef>
+          <a:effectRef idx="0">
+            <a:schemeClr val="accent1"/>
+          </a:effectRef>
+          <a:fontRef idx="minor">
+            <a:schemeClr val="lt1"/>
+          </a:fontRef>
+        </p:style>
+        <p:txBody>
+          <a:bodyPr rtlCol="0" anchor="ctr"/>
+          <a:lstStyle/>
+          <a:p>
+            <a:pPr algn="ctr"/>
+            <a:r>
+              <a:rPr lang="en-US" dirty="0"/>
+              <a:t>All the same type</a:t>
+            </a:r>
+          </a:p>
+        </p:txBody>
+      </p:sp>
     </p:spTree>
     <p:extLst>
       <p:ext uri="{BB962C8B-B14F-4D97-AF65-F5344CB8AC3E}">
         <p14:creationId xmlns:p14="http://schemas.microsoft.com/office/powerpoint/2010/main" val="1258595971"/>
+      </p:ext>
+    </p:extLst>
+  </p:cSld>
+  <p:clrMapOvr>
+    <a:masterClrMapping/>
+  </p:clrMapOvr>
+</p:sld>
+</file>
+
+<file path=ppt/slides/slide3.xml><?xml version="1.0" encoding="utf-8"?>
+<p:sld xmlns:a="http://schemas.openxmlformats.org/drawingml/2006/main" xmlns:r="http://schemas.openxmlformats.org/officeDocument/2006/relationships" xmlns:p="http://schemas.openxmlformats.org/presentationml/2006/main">
+  <p:cSld>
+    <p:spTree>
+      <p:nvGrpSpPr>
+        <p:cNvPr id="1" name=""/>
+        <p:cNvGrpSpPr/>
+        <p:nvPr/>
+      </p:nvGrpSpPr>
+      <p:grpSpPr>
+        <a:xfrm>
+          <a:off x="0" y="0"/>
+          <a:ext cx="0" cy="0"/>
+          <a:chOff x="0" y="0"/>
+          <a:chExt cx="0" cy="0"/>
+        </a:xfrm>
+      </p:grpSpPr>
+      <p:sp>
+        <p:nvSpPr>
+          <p:cNvPr id="2" name="Title 1">
+            <a:extLst>
+              <a:ext uri="{FF2B5EF4-FFF2-40B4-BE49-F238E27FC236}">
+                <a16:creationId xmlns:a16="http://schemas.microsoft.com/office/drawing/2014/main" id="{74B2C770-A4D5-44B2-BE47-9C640D56EE7C}"/>
+              </a:ext>
+            </a:extLst>
+          </p:cNvPr>
+          <p:cNvSpPr>
+            <a:spLocks noGrp="1"/>
+          </p:cNvSpPr>
+          <p:nvPr>
+            <p:ph type="title"/>
+          </p:nvPr>
+        </p:nvSpPr>
+        <p:spPr/>
+        <p:txBody>
+          <a:bodyPr/>
+          <a:lstStyle/>
+          <a:p>
+            <a:r>
+              <a:rPr lang="en-US" dirty="0"/>
+              <a:t>Declaring a map</a:t>
+            </a:r>
+          </a:p>
+        </p:txBody>
+      </p:sp>
+      <p:pic>
+        <p:nvPicPr>
+          <p:cNvPr id="5" name="Content Placeholder 4">
+            <a:extLst>
+              <a:ext uri="{FF2B5EF4-FFF2-40B4-BE49-F238E27FC236}">
+                <a16:creationId xmlns:a16="http://schemas.microsoft.com/office/drawing/2014/main" id="{0899E27B-412C-40FB-B124-CD3A83A7618B}"/>
+              </a:ext>
+            </a:extLst>
+          </p:cNvPr>
+          <p:cNvPicPr>
+            <a:picLocks noGrp="1" noChangeAspect="1"/>
+          </p:cNvPicPr>
+          <p:nvPr>
+            <p:ph idx="1"/>
+          </p:nvPr>
+        </p:nvPicPr>
+        <p:blipFill>
+          <a:blip r:embed="rId2"/>
+          <a:stretch>
+            <a:fillRect/>
+          </a:stretch>
+        </p:blipFill>
+        <p:spPr>
+          <a:xfrm>
+            <a:off x="3612639" y="747547"/>
+            <a:ext cx="2305372" cy="752580"/>
+          </a:xfrm>
+        </p:spPr>
+      </p:pic>
+    </p:spTree>
+    <p:extLst>
+      <p:ext uri="{BB962C8B-B14F-4D97-AF65-F5344CB8AC3E}">
+        <p14:creationId xmlns:p14="http://schemas.microsoft.com/office/powerpoint/2010/main" val="2231628283"/>
       </p:ext>
     </p:extLst>
   </p:cSld>

</xml_diff>

<commit_message>
Create iterating over map slide
</commit_message>
<xml_diff>
--- a/maps/Map.pptx
+++ b/maps/Map.pptx
@@ -8,6 +8,8 @@
     <p:sldId id="256" r:id="rId2"/>
     <p:sldId id="257" r:id="rId3"/>
     <p:sldId id="258" r:id="rId4"/>
+    <p:sldId id="259" r:id="rId5"/>
+    <p:sldId id="260" r:id="rId6"/>
   </p:sldIdLst>
   <p:sldSz cx="12192000" cy="6858000"/>
   <p:notesSz cx="6858000" cy="9144000"/>
@@ -4327,10 +4329,649 @@
           </a:xfrm>
         </p:spPr>
       </p:pic>
+      <p:pic>
+        <p:nvPicPr>
+          <p:cNvPr id="7" name="Picture 6">
+            <a:extLst>
+              <a:ext uri="{FF2B5EF4-FFF2-40B4-BE49-F238E27FC236}">
+                <a16:creationId xmlns:a16="http://schemas.microsoft.com/office/drawing/2014/main" id="{03A28974-E653-46AE-B778-D7CF76A042FC}"/>
+              </a:ext>
+            </a:extLst>
+          </p:cNvPr>
+          <p:cNvPicPr>
+            <a:picLocks noChangeAspect="1"/>
+          </p:cNvPicPr>
+          <p:nvPr/>
+        </p:nvPicPr>
+        <p:blipFill>
+          <a:blip r:embed="rId3"/>
+          <a:stretch>
+            <a:fillRect/>
+          </a:stretch>
+        </p:blipFill>
+        <p:spPr>
+          <a:xfrm>
+            <a:off x="3612638" y="1676998"/>
+            <a:ext cx="2305371" cy="285790"/>
+          </a:xfrm>
+          <a:prstGeom prst="rect">
+            <a:avLst/>
+          </a:prstGeom>
+        </p:spPr>
+      </p:pic>
+      <p:pic>
+        <p:nvPicPr>
+          <p:cNvPr id="9" name="Picture 8">
+            <a:extLst>
+              <a:ext uri="{FF2B5EF4-FFF2-40B4-BE49-F238E27FC236}">
+                <a16:creationId xmlns:a16="http://schemas.microsoft.com/office/drawing/2014/main" id="{6DA49674-5AC4-45C3-983C-462782016E01}"/>
+              </a:ext>
+            </a:extLst>
+          </p:cNvPr>
+          <p:cNvPicPr>
+            <a:picLocks noChangeAspect="1"/>
+          </p:cNvPicPr>
+          <p:nvPr/>
+        </p:nvPicPr>
+        <p:blipFill>
+          <a:blip r:embed="rId4"/>
+          <a:stretch>
+            <a:fillRect/>
+          </a:stretch>
+        </p:blipFill>
+        <p:spPr>
+          <a:xfrm>
+            <a:off x="3612638" y="2139659"/>
+            <a:ext cx="2524477" cy="266737"/>
+          </a:xfrm>
+          <a:prstGeom prst="rect">
+            <a:avLst/>
+          </a:prstGeom>
+        </p:spPr>
+      </p:pic>
     </p:spTree>
     <p:extLst>
       <p:ext uri="{BB962C8B-B14F-4D97-AF65-F5344CB8AC3E}">
         <p14:creationId xmlns:p14="http://schemas.microsoft.com/office/powerpoint/2010/main" val="2231628283"/>
+      </p:ext>
+    </p:extLst>
+  </p:cSld>
+  <p:clrMapOvr>
+    <a:masterClrMapping/>
+  </p:clrMapOvr>
+</p:sld>
+</file>
+
+<file path=ppt/slides/slide4.xml><?xml version="1.0" encoding="utf-8"?>
+<p:sld xmlns:a="http://schemas.openxmlformats.org/drawingml/2006/main" xmlns:r="http://schemas.openxmlformats.org/officeDocument/2006/relationships" xmlns:p="http://schemas.openxmlformats.org/presentationml/2006/main">
+  <p:cSld>
+    <p:spTree>
+      <p:nvGrpSpPr>
+        <p:cNvPr id="1" name=""/>
+        <p:cNvGrpSpPr/>
+        <p:nvPr/>
+      </p:nvGrpSpPr>
+      <p:grpSpPr>
+        <a:xfrm>
+          <a:off x="0" y="0"/>
+          <a:ext cx="0" cy="0"/>
+          <a:chOff x="0" y="0"/>
+          <a:chExt cx="0" cy="0"/>
+        </a:xfrm>
+      </p:grpSpPr>
+      <p:sp>
+        <p:nvSpPr>
+          <p:cNvPr id="2" name="Title 1">
+            <a:extLst>
+              <a:ext uri="{FF2B5EF4-FFF2-40B4-BE49-F238E27FC236}">
+                <a16:creationId xmlns:a16="http://schemas.microsoft.com/office/drawing/2014/main" id="{5485B2FC-F5E9-45A7-B7AF-2CE610AE23F6}"/>
+              </a:ext>
+            </a:extLst>
+          </p:cNvPr>
+          <p:cNvSpPr>
+            <a:spLocks noGrp="1"/>
+          </p:cNvSpPr>
+          <p:nvPr>
+            <p:ph type="title"/>
+          </p:nvPr>
+        </p:nvSpPr>
+        <p:spPr/>
+        <p:txBody>
+          <a:bodyPr/>
+          <a:lstStyle/>
+          <a:p>
+            <a:r>
+              <a:rPr lang="en-US" dirty="0"/>
+              <a:t>Adding and removing from a map</a:t>
+            </a:r>
+          </a:p>
+        </p:txBody>
+      </p:sp>
+      <p:pic>
+        <p:nvPicPr>
+          <p:cNvPr id="5" name="Content Placeholder 4">
+            <a:extLst>
+              <a:ext uri="{FF2B5EF4-FFF2-40B4-BE49-F238E27FC236}">
+                <a16:creationId xmlns:a16="http://schemas.microsoft.com/office/drawing/2014/main" id="{9F402ABF-CB1B-4FA3-91E4-5917F8E19DF7}"/>
+              </a:ext>
+            </a:extLst>
+          </p:cNvPr>
+          <p:cNvPicPr>
+            <a:picLocks noGrp="1" noChangeAspect="1"/>
+          </p:cNvPicPr>
+          <p:nvPr>
+            <p:ph idx="1"/>
+          </p:nvPr>
+        </p:nvPicPr>
+        <p:blipFill>
+          <a:blip r:embed="rId2"/>
+          <a:stretch>
+            <a:fillRect/>
+          </a:stretch>
+        </p:blipFill>
+        <p:spPr>
+          <a:xfrm>
+            <a:off x="4276744" y="780889"/>
+            <a:ext cx="2972215" cy="685896"/>
+          </a:xfrm>
+        </p:spPr>
+      </p:pic>
+      <p:pic>
+        <p:nvPicPr>
+          <p:cNvPr id="7" name="Picture 6">
+            <a:extLst>
+              <a:ext uri="{FF2B5EF4-FFF2-40B4-BE49-F238E27FC236}">
+                <a16:creationId xmlns:a16="http://schemas.microsoft.com/office/drawing/2014/main" id="{22141FE3-E13E-4803-9F2C-82FC26E095A4}"/>
+              </a:ext>
+            </a:extLst>
+          </p:cNvPr>
+          <p:cNvPicPr>
+            <a:picLocks noChangeAspect="1"/>
+          </p:cNvPicPr>
+          <p:nvPr/>
+        </p:nvPicPr>
+        <p:blipFill>
+          <a:blip r:embed="rId3"/>
+          <a:stretch>
+            <a:fillRect/>
+          </a:stretch>
+        </p:blipFill>
+        <p:spPr>
+          <a:xfrm>
+            <a:off x="4276744" y="2113841"/>
+            <a:ext cx="2429214" cy="409632"/>
+          </a:xfrm>
+          <a:prstGeom prst="rect">
+            <a:avLst/>
+          </a:prstGeom>
+        </p:spPr>
+      </p:pic>
+    </p:spTree>
+    <p:extLst>
+      <p:ext uri="{BB962C8B-B14F-4D97-AF65-F5344CB8AC3E}">
+        <p14:creationId xmlns:p14="http://schemas.microsoft.com/office/powerpoint/2010/main" val="3028460529"/>
+      </p:ext>
+    </p:extLst>
+  </p:cSld>
+  <p:clrMapOvr>
+    <a:masterClrMapping/>
+  </p:clrMapOvr>
+</p:sld>
+</file>
+
+<file path=ppt/slides/slide5.xml><?xml version="1.0" encoding="utf-8"?>
+<p:sld xmlns:a="http://schemas.openxmlformats.org/drawingml/2006/main" xmlns:r="http://schemas.openxmlformats.org/officeDocument/2006/relationships" xmlns:p="http://schemas.openxmlformats.org/presentationml/2006/main">
+  <p:cSld>
+    <p:spTree>
+      <p:nvGrpSpPr>
+        <p:cNvPr id="1" name=""/>
+        <p:cNvGrpSpPr/>
+        <p:nvPr/>
+      </p:nvGrpSpPr>
+      <p:grpSpPr>
+        <a:xfrm>
+          <a:off x="0" y="0"/>
+          <a:ext cx="0" cy="0"/>
+          <a:chOff x="0" y="0"/>
+          <a:chExt cx="0" cy="0"/>
+        </a:xfrm>
+      </p:grpSpPr>
+      <p:sp>
+        <p:nvSpPr>
+          <p:cNvPr id="12" name="Rectangle 11">
+            <a:extLst>
+              <a:ext uri="{FF2B5EF4-FFF2-40B4-BE49-F238E27FC236}">
+                <a16:creationId xmlns:a16="http://schemas.microsoft.com/office/drawing/2014/main" id="{ECE67B05-F82C-41CF-9B13-10321B9F620A}"/>
+              </a:ext>
+            </a:extLst>
+          </p:cNvPr>
+          <p:cNvSpPr/>
+          <p:nvPr/>
+        </p:nvSpPr>
+        <p:spPr>
+          <a:xfrm>
+            <a:off x="6472052" y="2856016"/>
+            <a:ext cx="487933" cy="290945"/>
+          </a:xfrm>
+          <a:prstGeom prst="rect">
+            <a:avLst/>
+          </a:prstGeom>
+        </p:spPr>
+        <p:style>
+          <a:lnRef idx="1">
+            <a:schemeClr val="accent5"/>
+          </a:lnRef>
+          <a:fillRef idx="2">
+            <a:schemeClr val="accent5"/>
+          </a:fillRef>
+          <a:effectRef idx="1">
+            <a:schemeClr val="accent5"/>
+          </a:effectRef>
+          <a:fontRef idx="minor">
+            <a:schemeClr val="dk1"/>
+          </a:fontRef>
+        </p:style>
+        <p:txBody>
+          <a:bodyPr rtlCol="0" anchor="ctr"/>
+          <a:lstStyle/>
+          <a:p>
+            <a:pPr algn="ctr"/>
+            <a:endParaRPr lang="en-US"/>
+          </a:p>
+        </p:txBody>
+      </p:sp>
+      <p:sp>
+        <p:nvSpPr>
+          <p:cNvPr id="5" name="Rectangle 4">
+            <a:extLst>
+              <a:ext uri="{FF2B5EF4-FFF2-40B4-BE49-F238E27FC236}">
+                <a16:creationId xmlns:a16="http://schemas.microsoft.com/office/drawing/2014/main" id="{9DEA7515-541E-4490-BE4D-6C88E5FE87E9}"/>
+              </a:ext>
+            </a:extLst>
+          </p:cNvPr>
+          <p:cNvSpPr/>
+          <p:nvPr/>
+        </p:nvSpPr>
+        <p:spPr>
+          <a:xfrm>
+            <a:off x="4957948" y="2856016"/>
+            <a:ext cx="579802" cy="290945"/>
+          </a:xfrm>
+          <a:prstGeom prst="rect">
+            <a:avLst/>
+          </a:prstGeom>
+        </p:spPr>
+        <p:style>
+          <a:lnRef idx="1">
+            <a:schemeClr val="accent1"/>
+          </a:lnRef>
+          <a:fillRef idx="2">
+            <a:schemeClr val="accent1"/>
+          </a:fillRef>
+          <a:effectRef idx="1">
+            <a:schemeClr val="accent1"/>
+          </a:effectRef>
+          <a:fontRef idx="minor">
+            <a:schemeClr val="dk1"/>
+          </a:fontRef>
+        </p:style>
+        <p:txBody>
+          <a:bodyPr rtlCol="0" anchor="ctr"/>
+          <a:lstStyle/>
+          <a:p>
+            <a:pPr algn="ctr"/>
+            <a:endParaRPr lang="en-US"/>
+          </a:p>
+        </p:txBody>
+      </p:sp>
+      <p:sp>
+        <p:nvSpPr>
+          <p:cNvPr id="4" name="Rectangle 3">
+            <a:extLst>
+              <a:ext uri="{FF2B5EF4-FFF2-40B4-BE49-F238E27FC236}">
+                <a16:creationId xmlns:a16="http://schemas.microsoft.com/office/drawing/2014/main" id="{FA1ED17E-95AA-4D0C-9EC8-29CA894433D8}"/>
+              </a:ext>
+            </a:extLst>
+          </p:cNvPr>
+          <p:cNvSpPr/>
+          <p:nvPr/>
+        </p:nvSpPr>
+        <p:spPr>
+          <a:xfrm>
+            <a:off x="4459184" y="2856016"/>
+            <a:ext cx="409699" cy="290945"/>
+          </a:xfrm>
+          <a:prstGeom prst="rect">
+            <a:avLst/>
+          </a:prstGeom>
+        </p:spPr>
+        <p:style>
+          <a:lnRef idx="1">
+            <a:schemeClr val="accent6"/>
+          </a:lnRef>
+          <a:fillRef idx="2">
+            <a:schemeClr val="accent6"/>
+          </a:fillRef>
+          <a:effectRef idx="1">
+            <a:schemeClr val="accent6"/>
+          </a:effectRef>
+          <a:fontRef idx="minor">
+            <a:schemeClr val="dk1"/>
+          </a:fontRef>
+        </p:style>
+        <p:txBody>
+          <a:bodyPr rtlCol="0" anchor="ctr"/>
+          <a:lstStyle/>
+          <a:p>
+            <a:pPr algn="ctr"/>
+            <a:endParaRPr lang="en-US"/>
+          </a:p>
+        </p:txBody>
+      </p:sp>
+      <p:sp>
+        <p:nvSpPr>
+          <p:cNvPr id="2" name="Title 1">
+            <a:extLst>
+              <a:ext uri="{FF2B5EF4-FFF2-40B4-BE49-F238E27FC236}">
+                <a16:creationId xmlns:a16="http://schemas.microsoft.com/office/drawing/2014/main" id="{3FC05233-EE24-4DA3-940D-EAD330309369}"/>
+              </a:ext>
+            </a:extLst>
+          </p:cNvPr>
+          <p:cNvSpPr>
+            <a:spLocks noGrp="1"/>
+          </p:cNvSpPr>
+          <p:nvPr>
+            <p:ph type="title"/>
+          </p:nvPr>
+        </p:nvSpPr>
+        <p:spPr/>
+        <p:txBody>
+          <a:bodyPr/>
+          <a:lstStyle/>
+          <a:p>
+            <a:r>
+              <a:rPr lang="en-US" dirty="0"/>
+              <a:t>Iterating over a map</a:t>
+            </a:r>
+          </a:p>
+        </p:txBody>
+      </p:sp>
+      <p:sp>
+        <p:nvSpPr>
+          <p:cNvPr id="3" name="Content Placeholder 2">
+            <a:extLst>
+              <a:ext uri="{FF2B5EF4-FFF2-40B4-BE49-F238E27FC236}">
+                <a16:creationId xmlns:a16="http://schemas.microsoft.com/office/drawing/2014/main" id="{1401646A-817E-4970-B23D-72BAEF634A76}"/>
+              </a:ext>
+            </a:extLst>
+          </p:cNvPr>
+          <p:cNvSpPr>
+            <a:spLocks noGrp="1"/>
+          </p:cNvSpPr>
+          <p:nvPr>
+            <p:ph idx="1"/>
+          </p:nvPr>
+        </p:nvSpPr>
+        <p:spPr/>
+        <p:txBody>
+          <a:bodyPr/>
+          <a:lstStyle/>
+          <a:p>
+            <a:r>
+              <a:rPr lang="en-US" dirty="0"/>
+              <a:t>for key, value := range map {</a:t>
+            </a:r>
+          </a:p>
+          <a:p>
+            <a:pPr marL="0" indent="0">
+              <a:buNone/>
+            </a:pPr>
+            <a:r>
+              <a:rPr lang="en-US" dirty="0"/>
+              <a:t>	//Execute some code</a:t>
+            </a:r>
+          </a:p>
+          <a:p>
+            <a:pPr marL="0" indent="0">
+              <a:buNone/>
+            </a:pPr>
+            <a:r>
+              <a:rPr lang="en-US" dirty="0"/>
+              <a:t>}</a:t>
+            </a:r>
+          </a:p>
+        </p:txBody>
+      </p:sp>
+      <p:cxnSp>
+        <p:nvCxnSpPr>
+          <p:cNvPr id="7" name="Straight Arrow Connector 6">
+            <a:extLst>
+              <a:ext uri="{FF2B5EF4-FFF2-40B4-BE49-F238E27FC236}">
+                <a16:creationId xmlns:a16="http://schemas.microsoft.com/office/drawing/2014/main" id="{D324E761-0503-421E-BA13-CE125130C509}"/>
+              </a:ext>
+            </a:extLst>
+          </p:cNvPr>
+          <p:cNvCxnSpPr>
+            <a:endCxn id="4" idx="0"/>
+          </p:cNvCxnSpPr>
+          <p:nvPr/>
+        </p:nvCxnSpPr>
+        <p:spPr>
+          <a:xfrm>
+            <a:off x="4649190" y="2309751"/>
+            <a:ext cx="14844" cy="546265"/>
+          </a:xfrm>
+          <a:prstGeom prst="straightConnector1">
+            <a:avLst/>
+          </a:prstGeom>
+          <a:ln>
+            <a:tailEnd type="triangle"/>
+          </a:ln>
+        </p:spPr>
+        <p:style>
+          <a:lnRef idx="1">
+            <a:schemeClr val="dk1"/>
+          </a:lnRef>
+          <a:fillRef idx="0">
+            <a:schemeClr val="dk1"/>
+          </a:fillRef>
+          <a:effectRef idx="0">
+            <a:schemeClr val="dk1"/>
+          </a:effectRef>
+          <a:fontRef idx="minor">
+            <a:schemeClr val="tx1"/>
+          </a:fontRef>
+        </p:style>
+      </p:cxnSp>
+      <p:cxnSp>
+        <p:nvCxnSpPr>
+          <p:cNvPr id="9" name="Connector: Elbow 8">
+            <a:extLst>
+              <a:ext uri="{FF2B5EF4-FFF2-40B4-BE49-F238E27FC236}">
+                <a16:creationId xmlns:a16="http://schemas.microsoft.com/office/drawing/2014/main" id="{1B16D024-E34C-4DF8-B0BB-7620F1F50A5D}"/>
+              </a:ext>
+            </a:extLst>
+          </p:cNvPr>
+          <p:cNvCxnSpPr>
+            <a:endCxn id="5" idx="0"/>
+          </p:cNvCxnSpPr>
+          <p:nvPr/>
+        </p:nvCxnSpPr>
+        <p:spPr>
+          <a:xfrm rot="5400000">
+            <a:off x="5218684" y="2338917"/>
+            <a:ext cx="546265" cy="487933"/>
+          </a:xfrm>
+          <a:prstGeom prst="bentConnector3">
+            <a:avLst/>
+          </a:prstGeom>
+          <a:ln>
+            <a:tailEnd type="triangle"/>
+          </a:ln>
+        </p:spPr>
+        <p:style>
+          <a:lnRef idx="1">
+            <a:schemeClr val="dk1"/>
+          </a:lnRef>
+          <a:fillRef idx="0">
+            <a:schemeClr val="dk1"/>
+          </a:fillRef>
+          <a:effectRef idx="0">
+            <a:schemeClr val="dk1"/>
+          </a:effectRef>
+          <a:fontRef idx="minor">
+            <a:schemeClr val="tx1"/>
+          </a:fontRef>
+        </p:style>
+      </p:cxnSp>
+      <p:sp>
+        <p:nvSpPr>
+          <p:cNvPr id="10" name="TextBox 9">
+            <a:extLst>
+              <a:ext uri="{FF2B5EF4-FFF2-40B4-BE49-F238E27FC236}">
+                <a16:creationId xmlns:a16="http://schemas.microsoft.com/office/drawing/2014/main" id="{A7923CD7-8058-44E4-BDCF-D474AFCF37D1}"/>
+              </a:ext>
+            </a:extLst>
+          </p:cNvPr>
+          <p:cNvSpPr txBox="1"/>
+          <p:nvPr/>
+        </p:nvSpPr>
+        <p:spPr>
+          <a:xfrm>
+            <a:off x="3806349" y="2010390"/>
+            <a:ext cx="1731402" cy="307777"/>
+          </a:xfrm>
+          <a:prstGeom prst="rect">
+            <a:avLst/>
+          </a:prstGeom>
+          <a:noFill/>
+        </p:spPr>
+        <p:txBody>
+          <a:bodyPr wrap="square" rtlCol="0">
+            <a:spAutoFit/>
+          </a:bodyPr>
+          <a:lstStyle/>
+          <a:p>
+            <a:r>
+              <a:rPr lang="en-US" sz="1400" dirty="0"/>
+              <a:t>Key for this iteration</a:t>
+            </a:r>
+          </a:p>
+        </p:txBody>
+      </p:sp>
+      <p:sp>
+        <p:nvSpPr>
+          <p:cNvPr id="11" name="TextBox 10">
+            <a:extLst>
+              <a:ext uri="{FF2B5EF4-FFF2-40B4-BE49-F238E27FC236}">
+                <a16:creationId xmlns:a16="http://schemas.microsoft.com/office/drawing/2014/main" id="{169F2996-E75E-4516-B405-9BE7BADCDA02}"/>
+              </a:ext>
+            </a:extLst>
+          </p:cNvPr>
+          <p:cNvSpPr txBox="1"/>
+          <p:nvPr/>
+        </p:nvSpPr>
+        <p:spPr>
+          <a:xfrm>
+            <a:off x="5398992" y="2001974"/>
+            <a:ext cx="1837362" cy="307777"/>
+          </a:xfrm>
+          <a:prstGeom prst="rect">
+            <a:avLst/>
+          </a:prstGeom>
+          <a:noFill/>
+        </p:spPr>
+        <p:txBody>
+          <a:bodyPr wrap="none" rtlCol="0">
+            <a:spAutoFit/>
+          </a:bodyPr>
+          <a:lstStyle/>
+          <a:p>
+            <a:r>
+              <a:rPr lang="en-US" sz="1400" dirty="0"/>
+              <a:t>Value for this iteration</a:t>
+            </a:r>
+          </a:p>
+        </p:txBody>
+      </p:sp>
+      <p:cxnSp>
+        <p:nvCxnSpPr>
+          <p:cNvPr id="14" name="Connector: Elbow 13">
+            <a:extLst>
+              <a:ext uri="{FF2B5EF4-FFF2-40B4-BE49-F238E27FC236}">
+                <a16:creationId xmlns:a16="http://schemas.microsoft.com/office/drawing/2014/main" id="{0290A035-F848-4940-98C2-2F736B495AC0}"/>
+              </a:ext>
+            </a:extLst>
+          </p:cNvPr>
+          <p:cNvCxnSpPr/>
+          <p:nvPr/>
+        </p:nvCxnSpPr>
+        <p:spPr>
+          <a:xfrm rot="10800000" flipV="1">
+            <a:off x="6959986" y="2143496"/>
+            <a:ext cx="1162737" cy="712520"/>
+          </a:xfrm>
+          <a:prstGeom prst="bentConnector3">
+            <a:avLst/>
+          </a:prstGeom>
+          <a:ln>
+            <a:tailEnd type="triangle"/>
+          </a:ln>
+        </p:spPr>
+        <p:style>
+          <a:lnRef idx="1">
+            <a:schemeClr val="dk1"/>
+          </a:lnRef>
+          <a:fillRef idx="0">
+            <a:schemeClr val="dk1"/>
+          </a:fillRef>
+          <a:effectRef idx="0">
+            <a:schemeClr val="dk1"/>
+          </a:effectRef>
+          <a:fontRef idx="minor">
+            <a:schemeClr val="tx1"/>
+          </a:fontRef>
+        </p:style>
+      </p:cxnSp>
+      <p:sp>
+        <p:nvSpPr>
+          <p:cNvPr id="15" name="TextBox 14">
+            <a:extLst>
+              <a:ext uri="{FF2B5EF4-FFF2-40B4-BE49-F238E27FC236}">
+                <a16:creationId xmlns:a16="http://schemas.microsoft.com/office/drawing/2014/main" id="{F82104B6-2710-4A03-8495-878985052E47}"/>
+              </a:ext>
+            </a:extLst>
+          </p:cNvPr>
+          <p:cNvSpPr txBox="1"/>
+          <p:nvPr/>
+        </p:nvSpPr>
+        <p:spPr>
+          <a:xfrm>
+            <a:off x="8122723" y="1989607"/>
+            <a:ext cx="2079415" cy="307777"/>
+          </a:xfrm>
+          <a:prstGeom prst="rect">
+            <a:avLst/>
+          </a:prstGeom>
+          <a:noFill/>
+        </p:spPr>
+        <p:txBody>
+          <a:bodyPr wrap="none" rtlCol="0">
+            <a:spAutoFit/>
+          </a:bodyPr>
+          <a:lstStyle/>
+          <a:p>
+            <a:r>
+              <a:rPr lang="en-US" sz="1400" dirty="0"/>
+              <a:t>Map we are iterating over</a:t>
+            </a:r>
+          </a:p>
+        </p:txBody>
+      </p:sp>
+    </p:spTree>
+    <p:extLst>
+      <p:ext uri="{BB962C8B-B14F-4D97-AF65-F5344CB8AC3E}">
+        <p14:creationId xmlns:p14="http://schemas.microsoft.com/office/powerpoint/2010/main" val="4226791022"/>
       </p:ext>
     </p:extLst>
   </p:cSld>

</xml_diff>